<commit_message>
Added notes to presentation
</commit_message>
<xml_diff>
--- a/presentation/PeerMarked.pptx
+++ b/presentation/PeerMarked.pptx
@@ -653,6 +653,809 @@
     </a:lvl9pPr>
   </p:notesStyle>
 </p:notesMaster>
+</file>
+
+<file path=ppt/notesSlides/notesSlide1.xml><?xml version="1.0" encoding="utf-8"?>
+<p:notes xmlns:a="http://schemas.openxmlformats.org/drawingml/2006/main" xmlns:r="http://schemas.openxmlformats.org/officeDocument/2006/relationships" xmlns:p="http://schemas.openxmlformats.org/presentationml/2006/main">
+  <p:cSld>
+    <p:spTree>
+      <p:nvGrpSpPr>
+        <p:cNvPr id="1" name=""/>
+        <p:cNvGrpSpPr/>
+        <p:nvPr/>
+      </p:nvGrpSpPr>
+      <p:grpSpPr>
+        <a:xfrm>
+          <a:off x="0" y="0"/>
+          <a:ext cx="0" cy="0"/>
+          <a:chOff x="0" y="0"/>
+          <a:chExt cx="0" cy="0"/>
+        </a:xfrm>
+      </p:grpSpPr>
+      <p:sp>
+        <p:nvSpPr>
+          <p:cNvPr id="2" name="Slide Image Placeholder 1"/>
+          <p:cNvSpPr>
+            <a:spLocks noGrp="1" noRot="1" noChangeAspect="1"/>
+          </p:cNvSpPr>
+          <p:nvPr>
+            <p:ph type="sldImg"/>
+          </p:nvPr>
+        </p:nvSpPr>
+        <p:spPr/>
+      </p:sp>
+      <p:sp>
+        <p:nvSpPr>
+          <p:cNvPr id="3" name="Notes Placeholder 2"/>
+          <p:cNvSpPr>
+            <a:spLocks noGrp="1"/>
+          </p:cNvSpPr>
+          <p:nvPr>
+            <p:ph type="body" idx="1"/>
+          </p:nvPr>
+        </p:nvSpPr>
+        <p:spPr/>
+        <p:txBody>
+          <a:bodyPr/>
+          <a:lstStyle/>
+          <a:p>
+            <a:r>
+              <a:rPr lang="en-US" dirty="0"/>
+              <a:t>Matthew</a:t>
+            </a:r>
+          </a:p>
+        </p:txBody>
+      </p:sp>
+      <p:sp>
+        <p:nvSpPr>
+          <p:cNvPr id="4" name="Slide Number Placeholder 3"/>
+          <p:cNvSpPr>
+            <a:spLocks noGrp="1"/>
+          </p:cNvSpPr>
+          <p:nvPr>
+            <p:ph type="sldNum" sz="quarter" idx="10"/>
+          </p:nvPr>
+        </p:nvSpPr>
+        <p:spPr/>
+        <p:txBody>
+          <a:bodyPr/>
+          <a:lstStyle/>
+          <a:p>
+            <a:fld id="{68322CDD-9D6C-4F63-9EC2-648226624108}" type="slidenum">
+              <a:rPr lang="en-US" smtClean="0"/>
+              <a:t>2</a:t>
+            </a:fld>
+            <a:endParaRPr lang="en-US"/>
+          </a:p>
+        </p:txBody>
+      </p:sp>
+    </p:spTree>
+    <p:extLst>
+      <p:ext uri="{BB962C8B-B14F-4D97-AF65-F5344CB8AC3E}">
+        <p14:creationId xmlns:p14="http://schemas.microsoft.com/office/powerpoint/2010/main" val="3846985603"/>
+      </p:ext>
+    </p:extLst>
+  </p:cSld>
+  <p:clrMapOvr>
+    <a:masterClrMapping/>
+  </p:clrMapOvr>
+</p:notes>
+</file>
+
+<file path=ppt/notesSlides/notesSlide2.xml><?xml version="1.0" encoding="utf-8"?>
+<p:notes xmlns:a="http://schemas.openxmlformats.org/drawingml/2006/main" xmlns:r="http://schemas.openxmlformats.org/officeDocument/2006/relationships" xmlns:p="http://schemas.openxmlformats.org/presentationml/2006/main">
+  <p:cSld>
+    <p:spTree>
+      <p:nvGrpSpPr>
+        <p:cNvPr id="1" name=""/>
+        <p:cNvGrpSpPr/>
+        <p:nvPr/>
+      </p:nvGrpSpPr>
+      <p:grpSpPr>
+        <a:xfrm>
+          <a:off x="0" y="0"/>
+          <a:ext cx="0" cy="0"/>
+          <a:chOff x="0" y="0"/>
+          <a:chExt cx="0" cy="0"/>
+        </a:xfrm>
+      </p:grpSpPr>
+      <p:sp>
+        <p:nvSpPr>
+          <p:cNvPr id="2" name="Slide Image Placeholder 1"/>
+          <p:cNvSpPr>
+            <a:spLocks noGrp="1" noRot="1" noChangeAspect="1"/>
+          </p:cNvSpPr>
+          <p:nvPr>
+            <p:ph type="sldImg"/>
+          </p:nvPr>
+        </p:nvSpPr>
+        <p:spPr/>
+      </p:sp>
+      <p:sp>
+        <p:nvSpPr>
+          <p:cNvPr id="3" name="Notes Placeholder 2"/>
+          <p:cNvSpPr>
+            <a:spLocks noGrp="1"/>
+          </p:cNvSpPr>
+          <p:nvPr>
+            <p:ph type="body" idx="1"/>
+          </p:nvPr>
+        </p:nvSpPr>
+        <p:spPr/>
+        <p:txBody>
+          <a:bodyPr/>
+          <a:lstStyle/>
+          <a:p>
+            <a:r>
+              <a:rPr lang="en-US" dirty="0"/>
+              <a:t>All of us</a:t>
+            </a:r>
+            <a:r>
+              <a:rPr lang="en-US" baseline="0" dirty="0"/>
+              <a:t> will introduce ourselves with our Name, School, Grade, and class we were in (java class or html class)</a:t>
+            </a:r>
+            <a:endParaRPr lang="en-US" dirty="0"/>
+          </a:p>
+        </p:txBody>
+      </p:sp>
+      <p:sp>
+        <p:nvSpPr>
+          <p:cNvPr id="4" name="Slide Number Placeholder 3"/>
+          <p:cNvSpPr>
+            <a:spLocks noGrp="1"/>
+          </p:cNvSpPr>
+          <p:nvPr>
+            <p:ph type="sldNum" sz="quarter" idx="10"/>
+          </p:nvPr>
+        </p:nvSpPr>
+        <p:spPr/>
+        <p:txBody>
+          <a:bodyPr/>
+          <a:lstStyle/>
+          <a:p>
+            <a:fld id="{68322CDD-9D6C-4F63-9EC2-648226624108}" type="slidenum">
+              <a:rPr lang="en-US" smtClean="0"/>
+              <a:t>3</a:t>
+            </a:fld>
+            <a:endParaRPr lang="en-US"/>
+          </a:p>
+        </p:txBody>
+      </p:sp>
+    </p:spTree>
+    <p:extLst>
+      <p:ext uri="{BB962C8B-B14F-4D97-AF65-F5344CB8AC3E}">
+        <p14:creationId xmlns:p14="http://schemas.microsoft.com/office/powerpoint/2010/main" val="876243302"/>
+      </p:ext>
+    </p:extLst>
+  </p:cSld>
+  <p:clrMapOvr>
+    <a:masterClrMapping/>
+  </p:clrMapOvr>
+</p:notes>
+</file>
+
+<file path=ppt/notesSlides/notesSlide3.xml><?xml version="1.0" encoding="utf-8"?>
+<p:notes xmlns:a="http://schemas.openxmlformats.org/drawingml/2006/main" xmlns:r="http://schemas.openxmlformats.org/officeDocument/2006/relationships" xmlns:p="http://schemas.openxmlformats.org/presentationml/2006/main">
+  <p:cSld>
+    <p:spTree>
+      <p:nvGrpSpPr>
+        <p:cNvPr id="1" name=""/>
+        <p:cNvGrpSpPr/>
+        <p:nvPr/>
+      </p:nvGrpSpPr>
+      <p:grpSpPr>
+        <a:xfrm>
+          <a:off x="0" y="0"/>
+          <a:ext cx="0" cy="0"/>
+          <a:chOff x="0" y="0"/>
+          <a:chExt cx="0" cy="0"/>
+        </a:xfrm>
+      </p:grpSpPr>
+      <p:sp>
+        <p:nvSpPr>
+          <p:cNvPr id="2" name="Slide Image Placeholder 1"/>
+          <p:cNvSpPr>
+            <a:spLocks noGrp="1" noRot="1" noChangeAspect="1"/>
+          </p:cNvSpPr>
+          <p:nvPr>
+            <p:ph type="sldImg"/>
+          </p:nvPr>
+        </p:nvSpPr>
+        <p:spPr/>
+      </p:sp>
+      <p:sp>
+        <p:nvSpPr>
+          <p:cNvPr id="3" name="Notes Placeholder 2"/>
+          <p:cNvSpPr>
+            <a:spLocks noGrp="1"/>
+          </p:cNvSpPr>
+          <p:nvPr>
+            <p:ph type="body" idx="1"/>
+          </p:nvPr>
+        </p:nvSpPr>
+        <p:spPr/>
+        <p:txBody>
+          <a:bodyPr/>
+          <a:lstStyle/>
+          <a:p>
+            <a:r>
+              <a:rPr lang="en-US" dirty="0"/>
+              <a:t>Cate</a:t>
+            </a:r>
+          </a:p>
+        </p:txBody>
+      </p:sp>
+      <p:sp>
+        <p:nvSpPr>
+          <p:cNvPr id="4" name="Slide Number Placeholder 3"/>
+          <p:cNvSpPr>
+            <a:spLocks noGrp="1"/>
+          </p:cNvSpPr>
+          <p:nvPr>
+            <p:ph type="sldNum" sz="quarter" idx="10"/>
+          </p:nvPr>
+        </p:nvSpPr>
+        <p:spPr/>
+        <p:txBody>
+          <a:bodyPr/>
+          <a:lstStyle/>
+          <a:p>
+            <a:fld id="{68322CDD-9D6C-4F63-9EC2-648226624108}" type="slidenum">
+              <a:rPr lang="en-US" smtClean="0"/>
+              <a:t>4</a:t>
+            </a:fld>
+            <a:endParaRPr lang="en-US"/>
+          </a:p>
+        </p:txBody>
+      </p:sp>
+    </p:spTree>
+    <p:extLst>
+      <p:ext uri="{BB962C8B-B14F-4D97-AF65-F5344CB8AC3E}">
+        <p14:creationId xmlns:p14="http://schemas.microsoft.com/office/powerpoint/2010/main" val="1367010682"/>
+      </p:ext>
+    </p:extLst>
+  </p:cSld>
+  <p:clrMapOvr>
+    <a:masterClrMapping/>
+  </p:clrMapOvr>
+</p:notes>
+</file>
+
+<file path=ppt/notesSlides/notesSlide4.xml><?xml version="1.0" encoding="utf-8"?>
+<p:notes xmlns:a="http://schemas.openxmlformats.org/drawingml/2006/main" xmlns:r="http://schemas.openxmlformats.org/officeDocument/2006/relationships" xmlns:p="http://schemas.openxmlformats.org/presentationml/2006/main">
+  <p:cSld>
+    <p:spTree>
+      <p:nvGrpSpPr>
+        <p:cNvPr id="1" name=""/>
+        <p:cNvGrpSpPr/>
+        <p:nvPr/>
+      </p:nvGrpSpPr>
+      <p:grpSpPr>
+        <a:xfrm>
+          <a:off x="0" y="0"/>
+          <a:ext cx="0" cy="0"/>
+          <a:chOff x="0" y="0"/>
+          <a:chExt cx="0" cy="0"/>
+        </a:xfrm>
+      </p:grpSpPr>
+      <p:sp>
+        <p:nvSpPr>
+          <p:cNvPr id="2" name="Slide Image Placeholder 1"/>
+          <p:cNvSpPr>
+            <a:spLocks noGrp="1" noRot="1" noChangeAspect="1"/>
+          </p:cNvSpPr>
+          <p:nvPr>
+            <p:ph type="sldImg"/>
+          </p:nvPr>
+        </p:nvSpPr>
+        <p:spPr/>
+      </p:sp>
+      <p:sp>
+        <p:nvSpPr>
+          <p:cNvPr id="3" name="Notes Placeholder 2"/>
+          <p:cNvSpPr>
+            <a:spLocks noGrp="1"/>
+          </p:cNvSpPr>
+          <p:nvPr>
+            <p:ph type="body" idx="1"/>
+          </p:nvPr>
+        </p:nvSpPr>
+        <p:spPr/>
+        <p:txBody>
+          <a:bodyPr/>
+          <a:lstStyle/>
+          <a:p>
+            <a:r>
+              <a:rPr lang="en-US" dirty="0"/>
+              <a:t>Jared</a:t>
+            </a:r>
+          </a:p>
+        </p:txBody>
+      </p:sp>
+      <p:sp>
+        <p:nvSpPr>
+          <p:cNvPr id="4" name="Slide Number Placeholder 3"/>
+          <p:cNvSpPr>
+            <a:spLocks noGrp="1"/>
+          </p:cNvSpPr>
+          <p:nvPr>
+            <p:ph type="sldNum" sz="quarter" idx="10"/>
+          </p:nvPr>
+        </p:nvSpPr>
+        <p:spPr/>
+        <p:txBody>
+          <a:bodyPr/>
+          <a:lstStyle/>
+          <a:p>
+            <a:fld id="{68322CDD-9D6C-4F63-9EC2-648226624108}" type="slidenum">
+              <a:rPr lang="en-US" smtClean="0"/>
+              <a:t>5</a:t>
+            </a:fld>
+            <a:endParaRPr lang="en-US"/>
+          </a:p>
+        </p:txBody>
+      </p:sp>
+    </p:spTree>
+    <p:extLst>
+      <p:ext uri="{BB962C8B-B14F-4D97-AF65-F5344CB8AC3E}">
+        <p14:creationId xmlns:p14="http://schemas.microsoft.com/office/powerpoint/2010/main" val="4194589387"/>
+      </p:ext>
+    </p:extLst>
+  </p:cSld>
+  <p:clrMapOvr>
+    <a:masterClrMapping/>
+  </p:clrMapOvr>
+</p:notes>
+</file>
+
+<file path=ppt/notesSlides/notesSlide5.xml><?xml version="1.0" encoding="utf-8"?>
+<p:notes xmlns:a="http://schemas.openxmlformats.org/drawingml/2006/main" xmlns:r="http://schemas.openxmlformats.org/officeDocument/2006/relationships" xmlns:p="http://schemas.openxmlformats.org/presentationml/2006/main">
+  <p:cSld>
+    <p:spTree>
+      <p:nvGrpSpPr>
+        <p:cNvPr id="1" name=""/>
+        <p:cNvGrpSpPr/>
+        <p:nvPr/>
+      </p:nvGrpSpPr>
+      <p:grpSpPr>
+        <a:xfrm>
+          <a:off x="0" y="0"/>
+          <a:ext cx="0" cy="0"/>
+          <a:chOff x="0" y="0"/>
+          <a:chExt cx="0" cy="0"/>
+        </a:xfrm>
+      </p:grpSpPr>
+      <p:sp>
+        <p:nvSpPr>
+          <p:cNvPr id="2" name="Slide Image Placeholder 1"/>
+          <p:cNvSpPr>
+            <a:spLocks noGrp="1" noRot="1" noChangeAspect="1"/>
+          </p:cNvSpPr>
+          <p:nvPr>
+            <p:ph type="sldImg"/>
+          </p:nvPr>
+        </p:nvSpPr>
+        <p:spPr/>
+      </p:sp>
+      <p:sp>
+        <p:nvSpPr>
+          <p:cNvPr id="3" name="Notes Placeholder 2"/>
+          <p:cNvSpPr>
+            <a:spLocks noGrp="1"/>
+          </p:cNvSpPr>
+          <p:nvPr>
+            <p:ph type="body" idx="1"/>
+          </p:nvPr>
+        </p:nvSpPr>
+        <p:spPr/>
+        <p:txBody>
+          <a:bodyPr/>
+          <a:lstStyle/>
+          <a:p>
+            <a:r>
+              <a:rPr lang="en-US" dirty="0"/>
+              <a:t>Ben</a:t>
+            </a:r>
+            <a:r>
+              <a:rPr lang="en-US" baseline="0" dirty="0"/>
+              <a:t> and Jared</a:t>
+            </a:r>
+            <a:endParaRPr lang="en-US" dirty="0"/>
+          </a:p>
+        </p:txBody>
+      </p:sp>
+      <p:sp>
+        <p:nvSpPr>
+          <p:cNvPr id="4" name="Slide Number Placeholder 3"/>
+          <p:cNvSpPr>
+            <a:spLocks noGrp="1"/>
+          </p:cNvSpPr>
+          <p:nvPr>
+            <p:ph type="sldNum" sz="quarter" idx="10"/>
+          </p:nvPr>
+        </p:nvSpPr>
+        <p:spPr/>
+        <p:txBody>
+          <a:bodyPr/>
+          <a:lstStyle/>
+          <a:p>
+            <a:fld id="{68322CDD-9D6C-4F63-9EC2-648226624108}" type="slidenum">
+              <a:rPr lang="en-US" smtClean="0"/>
+              <a:t>6</a:t>
+            </a:fld>
+            <a:endParaRPr lang="en-US"/>
+          </a:p>
+        </p:txBody>
+      </p:sp>
+    </p:spTree>
+    <p:extLst>
+      <p:ext uri="{BB962C8B-B14F-4D97-AF65-F5344CB8AC3E}">
+        <p14:creationId xmlns:p14="http://schemas.microsoft.com/office/powerpoint/2010/main" val="3359225309"/>
+      </p:ext>
+    </p:extLst>
+  </p:cSld>
+  <p:clrMapOvr>
+    <a:masterClrMapping/>
+  </p:clrMapOvr>
+</p:notes>
+</file>
+
+<file path=ppt/notesSlides/notesSlide6.xml><?xml version="1.0" encoding="utf-8"?>
+<p:notes xmlns:a="http://schemas.openxmlformats.org/drawingml/2006/main" xmlns:r="http://schemas.openxmlformats.org/officeDocument/2006/relationships" xmlns:p="http://schemas.openxmlformats.org/presentationml/2006/main">
+  <p:cSld>
+    <p:spTree>
+      <p:nvGrpSpPr>
+        <p:cNvPr id="1" name=""/>
+        <p:cNvGrpSpPr/>
+        <p:nvPr/>
+      </p:nvGrpSpPr>
+      <p:grpSpPr>
+        <a:xfrm>
+          <a:off x="0" y="0"/>
+          <a:ext cx="0" cy="0"/>
+          <a:chOff x="0" y="0"/>
+          <a:chExt cx="0" cy="0"/>
+        </a:xfrm>
+      </p:grpSpPr>
+      <p:sp>
+        <p:nvSpPr>
+          <p:cNvPr id="2" name="Slide Image Placeholder 1"/>
+          <p:cNvSpPr>
+            <a:spLocks noGrp="1" noRot="1" noChangeAspect="1"/>
+          </p:cNvSpPr>
+          <p:nvPr>
+            <p:ph type="sldImg"/>
+          </p:nvPr>
+        </p:nvSpPr>
+        <p:spPr/>
+      </p:sp>
+      <p:sp>
+        <p:nvSpPr>
+          <p:cNvPr id="3" name="Notes Placeholder 2"/>
+          <p:cNvSpPr>
+            <a:spLocks noGrp="1"/>
+          </p:cNvSpPr>
+          <p:nvPr>
+            <p:ph type="body" idx="1"/>
+          </p:nvPr>
+        </p:nvSpPr>
+        <p:spPr/>
+        <p:txBody>
+          <a:bodyPr/>
+          <a:lstStyle/>
+          <a:p>
+            <a:r>
+              <a:rPr lang="en-US" dirty="0"/>
+              <a:t>At this point, we will give a demonstration.</a:t>
+            </a:r>
+            <a:r>
+              <a:rPr lang="en-US" baseline="0" dirty="0"/>
+              <a:t> All of us will chirp in on this, we will discuss Saturday morning. Whatever you worked on though, you will demonstrate.</a:t>
+            </a:r>
+            <a:endParaRPr lang="en-US" dirty="0"/>
+          </a:p>
+        </p:txBody>
+      </p:sp>
+      <p:sp>
+        <p:nvSpPr>
+          <p:cNvPr id="4" name="Slide Number Placeholder 3"/>
+          <p:cNvSpPr>
+            <a:spLocks noGrp="1"/>
+          </p:cNvSpPr>
+          <p:nvPr>
+            <p:ph type="sldNum" sz="quarter" idx="10"/>
+          </p:nvPr>
+        </p:nvSpPr>
+        <p:spPr/>
+        <p:txBody>
+          <a:bodyPr/>
+          <a:lstStyle/>
+          <a:p>
+            <a:fld id="{68322CDD-9D6C-4F63-9EC2-648226624108}" type="slidenum">
+              <a:rPr lang="en-US" smtClean="0"/>
+              <a:t>7</a:t>
+            </a:fld>
+            <a:endParaRPr lang="en-US"/>
+          </a:p>
+        </p:txBody>
+      </p:sp>
+    </p:spTree>
+    <p:extLst>
+      <p:ext uri="{BB962C8B-B14F-4D97-AF65-F5344CB8AC3E}">
+        <p14:creationId xmlns:p14="http://schemas.microsoft.com/office/powerpoint/2010/main" val="3214460330"/>
+      </p:ext>
+    </p:extLst>
+  </p:cSld>
+  <p:clrMapOvr>
+    <a:masterClrMapping/>
+  </p:clrMapOvr>
+</p:notes>
+</file>
+
+<file path=ppt/notesSlides/notesSlide7.xml><?xml version="1.0" encoding="utf-8"?>
+<p:notes xmlns:a="http://schemas.openxmlformats.org/drawingml/2006/main" xmlns:r="http://schemas.openxmlformats.org/officeDocument/2006/relationships" xmlns:p="http://schemas.openxmlformats.org/presentationml/2006/main">
+  <p:cSld>
+    <p:spTree>
+      <p:nvGrpSpPr>
+        <p:cNvPr id="1" name=""/>
+        <p:cNvGrpSpPr/>
+        <p:nvPr/>
+      </p:nvGrpSpPr>
+      <p:grpSpPr>
+        <a:xfrm>
+          <a:off x="0" y="0"/>
+          <a:ext cx="0" cy="0"/>
+          <a:chOff x="0" y="0"/>
+          <a:chExt cx="0" cy="0"/>
+        </a:xfrm>
+      </p:grpSpPr>
+      <p:sp>
+        <p:nvSpPr>
+          <p:cNvPr id="2" name="Slide Image Placeholder 1"/>
+          <p:cNvSpPr>
+            <a:spLocks noGrp="1" noRot="1" noChangeAspect="1"/>
+          </p:cNvSpPr>
+          <p:nvPr>
+            <p:ph type="sldImg"/>
+          </p:nvPr>
+        </p:nvSpPr>
+        <p:spPr/>
+      </p:sp>
+      <p:sp>
+        <p:nvSpPr>
+          <p:cNvPr id="3" name="Notes Placeholder 2"/>
+          <p:cNvSpPr>
+            <a:spLocks noGrp="1"/>
+          </p:cNvSpPr>
+          <p:nvPr>
+            <p:ph type="body" idx="1"/>
+          </p:nvPr>
+        </p:nvSpPr>
+        <p:spPr/>
+        <p:txBody>
+          <a:bodyPr/>
+          <a:lstStyle/>
+          <a:p>
+            <a:r>
+              <a:rPr lang="en-US" dirty="0"/>
+              <a:t>Matthew</a:t>
+            </a:r>
+            <a:r>
+              <a:rPr lang="en-US" baseline="0" dirty="0"/>
+              <a:t> and Cate</a:t>
+            </a:r>
+            <a:endParaRPr lang="en-US" dirty="0"/>
+          </a:p>
+        </p:txBody>
+      </p:sp>
+      <p:sp>
+        <p:nvSpPr>
+          <p:cNvPr id="4" name="Slide Number Placeholder 3"/>
+          <p:cNvSpPr>
+            <a:spLocks noGrp="1"/>
+          </p:cNvSpPr>
+          <p:nvPr>
+            <p:ph type="sldNum" sz="quarter" idx="10"/>
+          </p:nvPr>
+        </p:nvSpPr>
+        <p:spPr/>
+        <p:txBody>
+          <a:bodyPr/>
+          <a:lstStyle/>
+          <a:p>
+            <a:fld id="{68322CDD-9D6C-4F63-9EC2-648226624108}" type="slidenum">
+              <a:rPr lang="en-US" smtClean="0"/>
+              <a:t>8</a:t>
+            </a:fld>
+            <a:endParaRPr lang="en-US"/>
+          </a:p>
+        </p:txBody>
+      </p:sp>
+    </p:spTree>
+    <p:extLst>
+      <p:ext uri="{BB962C8B-B14F-4D97-AF65-F5344CB8AC3E}">
+        <p14:creationId xmlns:p14="http://schemas.microsoft.com/office/powerpoint/2010/main" val="943731766"/>
+      </p:ext>
+    </p:extLst>
+  </p:cSld>
+  <p:clrMapOvr>
+    <a:masterClrMapping/>
+  </p:clrMapOvr>
+</p:notes>
+</file>
+
+<file path=ppt/notesSlides/notesSlide8.xml><?xml version="1.0" encoding="utf-8"?>
+<p:notes xmlns:a="http://schemas.openxmlformats.org/drawingml/2006/main" xmlns:r="http://schemas.openxmlformats.org/officeDocument/2006/relationships" xmlns:p="http://schemas.openxmlformats.org/presentationml/2006/main">
+  <p:cSld>
+    <p:spTree>
+      <p:nvGrpSpPr>
+        <p:cNvPr id="1" name=""/>
+        <p:cNvGrpSpPr/>
+        <p:nvPr/>
+      </p:nvGrpSpPr>
+      <p:grpSpPr>
+        <a:xfrm>
+          <a:off x="0" y="0"/>
+          <a:ext cx="0" cy="0"/>
+          <a:chOff x="0" y="0"/>
+          <a:chExt cx="0" cy="0"/>
+        </a:xfrm>
+      </p:grpSpPr>
+      <p:sp>
+        <p:nvSpPr>
+          <p:cNvPr id="2" name="Slide Image Placeholder 1"/>
+          <p:cNvSpPr>
+            <a:spLocks noGrp="1" noRot="1" noChangeAspect="1"/>
+          </p:cNvSpPr>
+          <p:nvPr>
+            <p:ph type="sldImg"/>
+          </p:nvPr>
+        </p:nvSpPr>
+        <p:spPr/>
+      </p:sp>
+      <p:sp>
+        <p:nvSpPr>
+          <p:cNvPr id="3" name="Notes Placeholder 2"/>
+          <p:cNvSpPr>
+            <a:spLocks noGrp="1"/>
+          </p:cNvSpPr>
+          <p:nvPr>
+            <p:ph type="body" idx="1"/>
+          </p:nvPr>
+        </p:nvSpPr>
+        <p:spPr/>
+        <p:txBody>
+          <a:bodyPr/>
+          <a:lstStyle/>
+          <a:p>
+            <a:r>
+              <a:rPr lang="en-US" dirty="0"/>
+              <a:t>Ben</a:t>
+            </a:r>
+          </a:p>
+        </p:txBody>
+      </p:sp>
+      <p:sp>
+        <p:nvSpPr>
+          <p:cNvPr id="4" name="Slide Number Placeholder 3"/>
+          <p:cNvSpPr>
+            <a:spLocks noGrp="1"/>
+          </p:cNvSpPr>
+          <p:nvPr>
+            <p:ph type="sldNum" sz="quarter" idx="10"/>
+          </p:nvPr>
+        </p:nvSpPr>
+        <p:spPr/>
+        <p:txBody>
+          <a:bodyPr/>
+          <a:lstStyle/>
+          <a:p>
+            <a:fld id="{68322CDD-9D6C-4F63-9EC2-648226624108}" type="slidenum">
+              <a:rPr lang="en-US" smtClean="0"/>
+              <a:t>9</a:t>
+            </a:fld>
+            <a:endParaRPr lang="en-US"/>
+          </a:p>
+        </p:txBody>
+      </p:sp>
+    </p:spTree>
+    <p:extLst>
+      <p:ext uri="{BB962C8B-B14F-4D97-AF65-F5344CB8AC3E}">
+        <p14:creationId xmlns:p14="http://schemas.microsoft.com/office/powerpoint/2010/main" val="2901809293"/>
+      </p:ext>
+    </p:extLst>
+  </p:cSld>
+  <p:clrMapOvr>
+    <a:masterClrMapping/>
+  </p:clrMapOvr>
+</p:notes>
+</file>
+
+<file path=ppt/notesSlides/notesSlide9.xml><?xml version="1.0" encoding="utf-8"?>
+<p:notes xmlns:a="http://schemas.openxmlformats.org/drawingml/2006/main" xmlns:r="http://schemas.openxmlformats.org/officeDocument/2006/relationships" xmlns:p="http://schemas.openxmlformats.org/presentationml/2006/main">
+  <p:cSld>
+    <p:spTree>
+      <p:nvGrpSpPr>
+        <p:cNvPr id="1" name=""/>
+        <p:cNvGrpSpPr/>
+        <p:nvPr/>
+      </p:nvGrpSpPr>
+      <p:grpSpPr>
+        <a:xfrm>
+          <a:off x="0" y="0"/>
+          <a:ext cx="0" cy="0"/>
+          <a:chOff x="0" y="0"/>
+          <a:chExt cx="0" cy="0"/>
+        </a:xfrm>
+      </p:grpSpPr>
+      <p:sp>
+        <p:nvSpPr>
+          <p:cNvPr id="2" name="Slide Image Placeholder 1"/>
+          <p:cNvSpPr>
+            <a:spLocks noGrp="1" noRot="1" noChangeAspect="1"/>
+          </p:cNvSpPr>
+          <p:nvPr>
+            <p:ph type="sldImg"/>
+          </p:nvPr>
+        </p:nvSpPr>
+        <p:spPr/>
+      </p:sp>
+      <p:sp>
+        <p:nvSpPr>
+          <p:cNvPr id="3" name="Notes Placeholder 2"/>
+          <p:cNvSpPr>
+            <a:spLocks noGrp="1"/>
+          </p:cNvSpPr>
+          <p:nvPr>
+            <p:ph type="body" idx="1"/>
+          </p:nvPr>
+        </p:nvSpPr>
+        <p:spPr/>
+        <p:txBody>
+          <a:bodyPr/>
+          <a:lstStyle/>
+          <a:p>
+            <a:r>
+              <a:rPr lang="en-US" dirty="0"/>
+              <a:t>Questions?</a:t>
+            </a:r>
+          </a:p>
+        </p:txBody>
+      </p:sp>
+      <p:sp>
+        <p:nvSpPr>
+          <p:cNvPr id="4" name="Slide Number Placeholder 3"/>
+          <p:cNvSpPr>
+            <a:spLocks noGrp="1"/>
+          </p:cNvSpPr>
+          <p:nvPr>
+            <p:ph type="sldNum" sz="quarter" idx="10"/>
+          </p:nvPr>
+        </p:nvSpPr>
+        <p:spPr/>
+        <p:txBody>
+          <a:bodyPr/>
+          <a:lstStyle/>
+          <a:p>
+            <a:fld id="{68322CDD-9D6C-4F63-9EC2-648226624108}" type="slidenum">
+              <a:rPr lang="en-US" smtClean="0"/>
+              <a:t>10</a:t>
+            </a:fld>
+            <a:endParaRPr lang="en-US"/>
+          </a:p>
+        </p:txBody>
+      </p:sp>
+    </p:spTree>
+    <p:extLst>
+      <p:ext uri="{BB962C8B-B14F-4D97-AF65-F5344CB8AC3E}">
+        <p14:creationId xmlns:p14="http://schemas.microsoft.com/office/powerpoint/2010/main" val="2951136951"/>
+      </p:ext>
+    </p:extLst>
+  </p:cSld>
+  <p:clrMapOvr>
+    <a:masterClrMapping/>
+  </p:clrMapOvr>
+</p:notes>
 </file>
 
 <file path=ppt/slideLayouts/slideLayout1.xml><?xml version="1.0" encoding="utf-8"?>
@@ -8760,25 +9563,6 @@
               <a:rPr lang="en-US" dirty="0"/>
               <a:t>Demonstration</a:t>
             </a:r>
-          </a:p>
-        </p:txBody>
-      </p:sp>
-      <p:sp>
-        <p:nvSpPr>
-          <p:cNvPr id="3" name="Subtitle 2"/>
-          <p:cNvSpPr>
-            <a:spLocks noGrp="1"/>
-          </p:cNvSpPr>
-          <p:nvPr>
-            <p:ph type="subTitle" idx="1"/>
-          </p:nvPr>
-        </p:nvSpPr>
-        <p:spPr/>
-        <p:txBody>
-          <a:bodyPr/>
-          <a:lstStyle/>
-          <a:p>
-            <a:endParaRPr lang="en-US" dirty="0"/>
           </a:p>
         </p:txBody>
       </p:sp>

</xml_diff>